<commit_message>
Add more content to all sessions
</commit_message>
<xml_diff>
--- a/fundamentals/2-State, Data types.pptx
+++ b/fundamentals/2-State, Data types.pptx
@@ -5,7 +5,7 @@
     <p:sldMasterId id="2147483954" r:id="rId1"/>
   </p:sldMasterIdLst>
   <p:notesMasterIdLst>
-    <p:notesMasterId r:id="rId18"/>
+    <p:notesMasterId r:id="rId19"/>
   </p:notesMasterIdLst>
   <p:sldIdLst>
     <p:sldId id="273" r:id="rId2"/>
@@ -24,6 +24,7 @@
     <p:sldId id="267" r:id="rId15"/>
     <p:sldId id="283" r:id="rId16"/>
     <p:sldId id="270" r:id="rId17"/>
+    <p:sldId id="280" r:id="rId18"/>
   </p:sldIdLst>
   <p:sldSz cx="12192000" cy="6858000"/>
   <p:notesSz cx="6858000" cy="9144000"/>
@@ -5493,6 +5494,168 @@
     <p:extLst>
       <p:ext uri="{BB962C8B-B14F-4D97-AF65-F5344CB8AC3E}">
         <p14:creationId xmlns:p14="http://schemas.microsoft.com/office/powerpoint/2010/main" val="3547435381"/>
+      </p:ext>
+    </p:extLst>
+  </p:cSld>
+  <p:clrMapOvr>
+    <a:masterClrMapping/>
+  </p:clrMapOvr>
+</p:sld>
+</file>
+
+<file path=ppt/slides/slide17.xml><?xml version="1.0" encoding="utf-8"?>
+<p:sld xmlns:a="http://schemas.openxmlformats.org/drawingml/2006/main" xmlns:r="http://schemas.openxmlformats.org/officeDocument/2006/relationships" xmlns:p="http://schemas.openxmlformats.org/presentationml/2006/main">
+  <p:cSld>
+    <p:spTree>
+      <p:nvGrpSpPr>
+        <p:cNvPr id="1" name=""/>
+        <p:cNvGrpSpPr/>
+        <p:nvPr/>
+      </p:nvGrpSpPr>
+      <p:grpSpPr>
+        <a:xfrm>
+          <a:off x="0" y="0"/>
+          <a:ext cx="0" cy="0"/>
+          <a:chOff x="0" y="0"/>
+          <a:chExt cx="0" cy="0"/>
+        </a:xfrm>
+      </p:grpSpPr>
+      <p:sp>
+        <p:nvSpPr>
+          <p:cNvPr id="2" name="Title 1">
+            <a:extLst>
+              <a:ext uri="{FF2B5EF4-FFF2-40B4-BE49-F238E27FC236}">
+                <a16:creationId xmlns:a16="http://schemas.microsoft.com/office/drawing/2014/main" id="{A0A9ADA6-4AC5-1B4C-8B4D-A660FDFE89F6}"/>
+              </a:ext>
+            </a:extLst>
+          </p:cNvPr>
+          <p:cNvSpPr>
+            <a:spLocks noGrp="1"/>
+          </p:cNvSpPr>
+          <p:nvPr>
+            <p:ph type="title"/>
+          </p:nvPr>
+        </p:nvSpPr>
+        <p:spPr>
+          <a:xfrm>
+            <a:off x="1175512" y="870132"/>
+            <a:ext cx="9792208" cy="1527078"/>
+          </a:xfrm>
+        </p:spPr>
+        <p:txBody>
+          <a:bodyPr>
+            <a:normAutofit/>
+          </a:bodyPr>
+          <a:lstStyle/>
+          <a:p>
+            <a:r>
+              <a:rPr lang="en-US" dirty="0"/>
+              <a:t>More …</a:t>
+            </a:r>
+          </a:p>
+        </p:txBody>
+      </p:sp>
+      <p:sp>
+        <p:nvSpPr>
+          <p:cNvPr id="3" name="Content Placeholder 2">
+            <a:extLst>
+              <a:ext uri="{FF2B5EF4-FFF2-40B4-BE49-F238E27FC236}">
+                <a16:creationId xmlns:a16="http://schemas.microsoft.com/office/drawing/2014/main" id="{1338A229-F889-2D44-93A4-E978CAE2312A}"/>
+              </a:ext>
+            </a:extLst>
+          </p:cNvPr>
+          <p:cNvSpPr>
+            <a:spLocks noGrp="1"/>
+          </p:cNvSpPr>
+          <p:nvPr>
+            <p:ph idx="1"/>
+          </p:nvPr>
+        </p:nvSpPr>
+        <p:spPr>
+          <a:xfrm>
+            <a:off x="1175512" y="2557849"/>
+            <a:ext cx="9792208" cy="3407862"/>
+          </a:xfrm>
+        </p:spPr>
+        <p:txBody>
+          <a:bodyPr>
+            <a:normAutofit fontScale="70000" lnSpcReduction="20000"/>
+          </a:bodyPr>
+          <a:lstStyle/>
+          <a:p>
+            <a:r>
+              <a:rPr lang="en-US" dirty="0"/>
+              <a:t>Use </a:t>
+            </a:r>
+            <a:r>
+              <a:rPr lang="en-US" b="1" dirty="0"/>
+              <a:t>bitwise operator(s)</a:t>
+            </a:r>
+            <a:r>
+              <a:rPr lang="en-US" dirty="0"/>
+              <a:t> to</a:t>
+            </a:r>
+          </a:p>
+          <a:p>
+            <a:r>
+              <a:rPr lang="en-US" dirty="0"/>
+              <a:t>Check if a number is even</a:t>
+            </a:r>
+          </a:p>
+          <a:p>
+            <a:r>
+              <a:rPr lang="en-US" dirty="0"/>
+              <a:t>Check if a number is odd</a:t>
+            </a:r>
+          </a:p>
+          <a:p>
+            <a:r>
+              <a:rPr lang="en-US" dirty="0"/>
+              <a:t>Check if a number is a power of 2</a:t>
+            </a:r>
+          </a:p>
+          <a:p>
+            <a:r>
+              <a:rPr lang="en-US" dirty="0"/>
+              <a:t>Check if a number can be represented by 1 byte</a:t>
+            </a:r>
+          </a:p>
+          <a:p>
+            <a:r>
+              <a:rPr lang="en-US" dirty="0"/>
+              <a:t>Check if a number can be represented by 2 bytes</a:t>
+            </a:r>
+          </a:p>
+          <a:p>
+            <a:r>
+              <a:rPr lang="en-US" dirty="0"/>
+              <a:t>Check if a number can be represented by 4 bytes</a:t>
+            </a:r>
+          </a:p>
+          <a:p>
+            <a:r>
+              <a:rPr lang="en-US" dirty="0"/>
+              <a:t>Check if a number can be represented by 8 bytes</a:t>
+            </a:r>
+          </a:p>
+          <a:p>
+            <a:endParaRPr lang="en-US" dirty="0"/>
+          </a:p>
+          <a:p>
+            <a:r>
+              <a:rPr lang="en-US" i="1" dirty="0"/>
+              <a:t>Pen + Paper is fine but if you can REPLT it, then super !</a:t>
+            </a:r>
+          </a:p>
+          <a:p>
+            <a:endParaRPr lang="en-US" dirty="0"/>
+          </a:p>
+        </p:txBody>
+      </p:sp>
+    </p:spTree>
+    <p:extLst>
+      <p:ext uri="{BB962C8B-B14F-4D97-AF65-F5344CB8AC3E}">
+        <p14:creationId xmlns:p14="http://schemas.microsoft.com/office/powerpoint/2010/main" val="3327990682"/>
       </p:ext>
     </p:extLst>
   </p:cSld>

</xml_diff>

<commit_message>
Edits to session #2
</commit_message>
<xml_diff>
--- a/fundamentals/2-State, Data types.pptx
+++ b/fundamentals/2-State, Data types.pptx
@@ -226,7 +226,7 @@
           <a:p>
             <a:fld id="{720C9186-47A3-C54A-A8AF-47B660C0099D}" type="datetimeFigureOut">
               <a:rPr lang="en-US" smtClean="0"/>
-              <a:t>7/5/20</a:t>
+              <a:t>7/12/20</a:t>
             </a:fld>
             <a:endParaRPr lang="en-US"/>
           </a:p>
@@ -727,7 +727,7 @@
           <a:p>
             <a:fld id="{4AAD347D-5ACD-4C99-B74B-A9C85AD731AF}" type="datetimeFigureOut">
               <a:rPr lang="en-US" smtClean="0"/>
-              <a:t>7/5/20</a:t>
+              <a:t>7/12/20</a:t>
             </a:fld>
             <a:endParaRPr lang="en-US" dirty="0"/>
           </a:p>
@@ -927,7 +927,7 @@
           <a:p>
             <a:fld id="{4AAD347D-5ACD-4C99-B74B-A9C85AD731AF}" type="datetimeFigureOut">
               <a:rPr lang="en-US" smtClean="0"/>
-              <a:t>7/5/20</a:t>
+              <a:t>7/12/20</a:t>
             </a:fld>
             <a:endParaRPr lang="en-US" dirty="0"/>
           </a:p>
@@ -1138,7 +1138,7 @@
           <a:p>
             <a:fld id="{4AAD347D-5ACD-4C99-B74B-A9C85AD731AF}" type="datetimeFigureOut">
               <a:rPr lang="en-US" smtClean="0"/>
-              <a:t>7/5/20</a:t>
+              <a:t>7/12/20</a:t>
             </a:fld>
             <a:endParaRPr lang="en-US" dirty="0"/>
           </a:p>
@@ -1339,7 +1339,7 @@
           <a:p>
             <a:fld id="{4AAD347D-5ACD-4C99-B74B-A9C85AD731AF}" type="datetimeFigureOut">
               <a:rPr lang="en-US" smtClean="0"/>
-              <a:t>7/5/20</a:t>
+              <a:t>7/12/20</a:t>
             </a:fld>
             <a:endParaRPr lang="en-US" dirty="0"/>
           </a:p>
@@ -1616,7 +1616,7 @@
           <a:p>
             <a:fld id="{9796027F-7875-4030-9381-8BD8C4F21935}" type="datetimeFigureOut">
               <a:rPr lang="en-US" smtClean="0"/>
-              <a:t>7/5/20</a:t>
+              <a:t>7/12/20</a:t>
             </a:fld>
             <a:endParaRPr lang="en-US" dirty="0"/>
           </a:p>
@@ -1884,7 +1884,7 @@
           <a:p>
             <a:fld id="{4AAD347D-5ACD-4C99-B74B-A9C85AD731AF}" type="datetimeFigureOut">
               <a:rPr lang="en-US" smtClean="0"/>
-              <a:t>7/5/20</a:t>
+              <a:t>7/12/20</a:t>
             </a:fld>
             <a:endParaRPr lang="en-US" dirty="0"/>
           </a:p>
@@ -2305,7 +2305,7 @@
           <a:p>
             <a:fld id="{4AAD347D-5ACD-4C99-B74B-A9C85AD731AF}" type="datetimeFigureOut">
               <a:rPr lang="en-US" smtClean="0"/>
-              <a:t>7/5/20</a:t>
+              <a:t>7/12/20</a:t>
             </a:fld>
             <a:endParaRPr lang="en-US" dirty="0"/>
           </a:p>
@@ -2448,7 +2448,7 @@
           <a:p>
             <a:fld id="{4509A250-FF31-4206-8172-F9D3106AACB1}" type="datetimeFigureOut">
               <a:rPr lang="en-US" smtClean="0"/>
-              <a:t>7/5/20</a:t>
+              <a:t>7/12/20</a:t>
             </a:fld>
             <a:endParaRPr lang="en-US" dirty="0"/>
           </a:p>
@@ -2561,7 +2561,7 @@
           <a:p>
             <a:fld id="{4509A250-FF31-4206-8172-F9D3106AACB1}" type="datetimeFigureOut">
               <a:rPr lang="en-US" smtClean="0"/>
-              <a:t>7/5/20</a:t>
+              <a:t>7/12/20</a:t>
             </a:fld>
             <a:endParaRPr lang="en-US" dirty="0"/>
           </a:p>
@@ -2874,7 +2874,7 @@
           <a:p>
             <a:fld id="{4AAD347D-5ACD-4C99-B74B-A9C85AD731AF}" type="datetimeFigureOut">
               <a:rPr lang="en-US" smtClean="0"/>
-              <a:t>7/5/20</a:t>
+              <a:t>7/12/20</a:t>
             </a:fld>
             <a:endParaRPr lang="en-US" dirty="0"/>
           </a:p>
@@ -3173,7 +3173,7 @@
           <a:p>
             <a:fld id="{4509A250-FF31-4206-8172-F9D3106AACB1}" type="datetimeFigureOut">
               <a:rPr lang="en-US" smtClean="0"/>
-              <a:t>7/5/20</a:t>
+              <a:t>7/12/20</a:t>
             </a:fld>
             <a:endParaRPr lang="en-US" dirty="0"/>
           </a:p>
@@ -3419,7 +3419,7 @@
           <a:p>
             <a:fld id="{4AAD347D-5ACD-4C99-B74B-A9C85AD731AF}" type="datetimeFigureOut">
               <a:rPr lang="en-US" smtClean="0"/>
-              <a:t>7/5/20</a:t>
+              <a:t>7/12/20</a:t>
             </a:fld>
             <a:endParaRPr lang="en-US" dirty="0"/>
           </a:p>
@@ -7841,7 +7841,7 @@
           <p:nvPr>
             <p:extLst>
               <p:ext uri="{D42A27DB-BD31-4B8C-83A1-F6EECF244321}">
-                <p14:modId xmlns:p14="http://schemas.microsoft.com/office/powerpoint/2010/main" val="4062214398"/>
+                <p14:modId xmlns:p14="http://schemas.microsoft.com/office/powerpoint/2010/main" val="2932075871"/>
               </p:ext>
             </p:extLst>
           </p:nvPr>
@@ -8054,7 +8054,92 @@
                             <a:srgbClr val="0070C0"/>
                           </a:solidFill>
                         </a:rPr>
-                        <a:t>1</a:t>
+                        <a:t>0</a:t>
+                      </a:r>
+                    </a:p>
+                  </a:txBody>
+                  <a:tcPr/>
+                </a:tc>
+                <a:tc>
+                  <a:txBody>
+                    <a:bodyPr/>
+                    <a:lstStyle/>
+                    <a:p>
+                      <a:r>
+                        <a:rPr lang="en-US" dirty="0">
+                          <a:solidFill>
+                            <a:srgbClr val="0070C0"/>
+                          </a:solidFill>
+                        </a:rPr>
+                        <a:t>0</a:t>
+                      </a:r>
+                    </a:p>
+                  </a:txBody>
+                  <a:tcPr/>
+                </a:tc>
+                <a:tc>
+                  <a:txBody>
+                    <a:bodyPr/>
+                    <a:lstStyle/>
+                    <a:p>
+                      <a:r>
+                        <a:rPr lang="en-US" dirty="0">
+                          <a:solidFill>
+                            <a:srgbClr val="0070C0"/>
+                          </a:solidFill>
+                        </a:rPr>
+                        <a:t>0</a:t>
+                      </a:r>
+                    </a:p>
+                  </a:txBody>
+                  <a:tcPr/>
+                </a:tc>
+                <a:tc>
+                  <a:txBody>
+                    <a:bodyPr/>
+                    <a:lstStyle/>
+                    <a:p>
+                      <a:r>
+                        <a:rPr lang="en-US" dirty="0">
+                          <a:solidFill>
+                            <a:srgbClr val="0070C0"/>
+                          </a:solidFill>
+                        </a:rPr>
+                        <a:t>0</a:t>
+                      </a:r>
+                    </a:p>
+                  </a:txBody>
+                  <a:tcPr/>
+                </a:tc>
+                <a:tc>
+                  <a:txBody>
+                    <a:bodyPr/>
+                    <a:lstStyle/>
+                    <a:p>
+                      <a:r>
+                        <a:rPr lang="en-US" dirty="0">
+                          <a:solidFill>
+                            <a:srgbClr val="0070C0"/>
+                          </a:solidFill>
+                        </a:rPr>
+                        <a:t>0</a:t>
+                      </a:r>
+                    </a:p>
+                  </a:txBody>
+                  <a:tcPr/>
+                </a:tc>
+                <a:tc>
+                  <a:txBody>
+                    <a:bodyPr/>
+                    <a:lstStyle/>
+                    <a:p>
+                      <a:r>
+                        <a:rPr lang="en-US" dirty="0">
+                          <a:solidFill>
+                            <a:srgbClr val="0070C0"/>
+                          </a:solidFill>
+                        </a:rPr>
+                        <a:t>0</a:t>
                       </a:r>
                     </a:p>
                   </a:txBody>
@@ -8072,91 +8157,6 @@
                           </a:solidFill>
                         </a:rPr>
                         <a:t>1</a:t>
-                      </a:r>
-                    </a:p>
-                  </a:txBody>
-                  <a:tcPr/>
-                </a:tc>
-                <a:tc>
-                  <a:txBody>
-                    <a:bodyPr/>
-                    <a:lstStyle/>
-                    <a:p>
-                      <a:r>
-                        <a:rPr lang="en-US" dirty="0">
-                          <a:solidFill>
-                            <a:srgbClr val="0070C0"/>
-                          </a:solidFill>
-                        </a:rPr>
-                        <a:t>0</a:t>
-                      </a:r>
-                    </a:p>
-                  </a:txBody>
-                  <a:tcPr/>
-                </a:tc>
-                <a:tc>
-                  <a:txBody>
-                    <a:bodyPr/>
-                    <a:lstStyle/>
-                    <a:p>
-                      <a:r>
-                        <a:rPr lang="en-US" dirty="0">
-                          <a:solidFill>
-                            <a:srgbClr val="0070C0"/>
-                          </a:solidFill>
-                        </a:rPr>
-                        <a:t>1</a:t>
-                      </a:r>
-                    </a:p>
-                  </a:txBody>
-                  <a:tcPr/>
-                </a:tc>
-                <a:tc>
-                  <a:txBody>
-                    <a:bodyPr/>
-                    <a:lstStyle/>
-                    <a:p>
-                      <a:r>
-                        <a:rPr lang="en-US" dirty="0">
-                          <a:solidFill>
-                            <a:srgbClr val="0070C0"/>
-                          </a:solidFill>
-                        </a:rPr>
-                        <a:t>1</a:t>
-                      </a:r>
-                    </a:p>
-                  </a:txBody>
-                  <a:tcPr/>
-                </a:tc>
-                <a:tc>
-                  <a:txBody>
-                    <a:bodyPr/>
-                    <a:lstStyle/>
-                    <a:p>
-                      <a:r>
-                        <a:rPr lang="en-US" dirty="0">
-                          <a:solidFill>
-                            <a:srgbClr val="0070C0"/>
-                          </a:solidFill>
-                        </a:rPr>
-                        <a:t>0</a:t>
-                      </a:r>
-                    </a:p>
-                  </a:txBody>
-                  <a:tcPr/>
-                </a:tc>
-                <a:tc>
-                  <a:txBody>
-                    <a:bodyPr/>
-                    <a:lstStyle/>
-                    <a:p>
-                      <a:r>
-                        <a:rPr lang="en-US" dirty="0">
-                          <a:solidFill>
-                            <a:srgbClr val="0070C0"/>
-                          </a:solidFill>
-                        </a:rPr>
-                        <a:t>0</a:t>
                       </a:r>
                     </a:p>
                   </a:txBody>
@@ -8291,7 +8291,7 @@
                             <a:srgbClr val="00B050"/>
                           </a:solidFill>
                         </a:rPr>
-                        <a:t>1</a:t>
+                        <a:t>0</a:t>
                       </a:r>
                     </a:p>
                   </a:txBody>
@@ -8359,7 +8359,7 @@
                             <a:srgbClr val="00B050"/>
                           </a:solidFill>
                         </a:rPr>
-                        <a:t>1</a:t>
+                        <a:t>0</a:t>
                       </a:r>
                     </a:p>
                   </a:txBody>
@@ -8393,7 +8393,7 @@
                             <a:srgbClr val="00B050"/>
                           </a:solidFill>
                         </a:rPr>
-                        <a:t>1</a:t>
+                        <a:t>0</a:t>
                       </a:r>
                     </a:p>
                   </a:txBody>
@@ -8553,7 +8553,7 @@
                             <a:srgbClr val="00B050"/>
                           </a:solidFill>
                         </a:rPr>
-                        <a:t>0</a:t>
+                        <a:t>1</a:t>
                       </a:r>
                     </a:p>
                   </a:txBody>
@@ -8594,7 +8594,24 @@
                             <a:srgbClr val="00B050"/>
                           </a:solidFill>
                         </a:rPr>
-                        <a:t>1</a:t>
+                        <a:t>0</a:t>
+                      </a:r>
+                    </a:p>
+                  </a:txBody>
+                  <a:tcPr/>
+                </a:tc>
+                <a:tc>
+                  <a:txBody>
+                    <a:bodyPr/>
+                    <a:lstStyle/>
+                    <a:p>
+                      <a:r>
+                        <a:rPr lang="en-US" dirty="0">
+                          <a:solidFill>
+                            <a:srgbClr val="00B050"/>
+                          </a:solidFill>
+                        </a:rPr>
+                        <a:t>0</a:t>
                       </a:r>
                     </a:p>
                   </a:txBody>
@@ -8646,23 +8663,6 @@
                           </a:solidFill>
                         </a:rPr>
                         <a:t>1</a:t>
-                      </a:r>
-                    </a:p>
-                  </a:txBody>
-                  <a:tcPr/>
-                </a:tc>
-                <a:tc>
-                  <a:txBody>
-                    <a:bodyPr/>
-                    <a:lstStyle/>
-                    <a:p>
-                      <a:r>
-                        <a:rPr lang="en-US" dirty="0">
-                          <a:solidFill>
-                            <a:srgbClr val="00B050"/>
-                          </a:solidFill>
-                        </a:rPr>
-                        <a:t>0</a:t>
                       </a:r>
                     </a:p>
                   </a:txBody>
@@ -8720,7 +8720,7 @@
                             <a:srgbClr val="00B050"/>
                           </a:solidFill>
                         </a:rPr>
-                        <a:t>1</a:t>
+                        <a:t>0</a:t>
                       </a:r>
                     </a:p>
                   </a:txBody>
@@ -8788,24 +8788,7 @@
                             <a:srgbClr val="00B050"/>
                           </a:solidFill>
                         </a:rPr>
-                        <a:t>0</a:t>
-                      </a:r>
-                    </a:p>
-                  </a:txBody>
-                  <a:tcPr/>
-                </a:tc>
-                <a:tc>
-                  <a:txBody>
-                    <a:bodyPr/>
-                    <a:lstStyle/>
-                    <a:p>
-                      <a:r>
-                        <a:rPr lang="en-US" dirty="0">
-                          <a:solidFill>
-                            <a:srgbClr val="00B050"/>
-                          </a:solidFill>
-                        </a:rPr>
-                        <a:t>0</a:t>
+                        <a:t>1</a:t>
                       </a:r>
                     </a:p>
                   </a:txBody>
@@ -8839,7 +8822,24 @@
                             <a:srgbClr val="00B050"/>
                           </a:solidFill>
                         </a:rPr>
-                        <a:t>0</a:t>
+                        <a:t>1</a:t>
+                      </a:r>
+                    </a:p>
+                  </a:txBody>
+                  <a:tcPr/>
+                </a:tc>
+                <a:tc>
+                  <a:txBody>
+                    <a:bodyPr/>
+                    <a:lstStyle/>
+                    <a:p>
+                      <a:r>
+                        <a:rPr lang="en-US" dirty="0">
+                          <a:solidFill>
+                            <a:srgbClr val="00B050"/>
+                          </a:solidFill>
+                        </a:rPr>
+                        <a:t>1</a:t>
                       </a:r>
                     </a:p>
                   </a:txBody>
@@ -10381,14 +10381,14 @@
           <p:nvPr>
             <p:extLst>
               <p:ext uri="{D42A27DB-BD31-4B8C-83A1-F6EECF244321}">
-                <p14:modId xmlns:p14="http://schemas.microsoft.com/office/powerpoint/2010/main" val="3513355893"/>
+                <p14:modId xmlns:p14="http://schemas.microsoft.com/office/powerpoint/2010/main" val="1097571958"/>
               </p:ext>
             </p:extLst>
           </p:nvPr>
         </p:nvGraphicFramePr>
         <p:xfrm>
-          <a:off x="124505" y="1859053"/>
-          <a:ext cx="745498" cy="2926080"/>
+          <a:off x="114944" y="1830918"/>
+          <a:ext cx="638002" cy="2954214"/>
         </p:xfrm>
         <a:graphic>
           <a:graphicData uri="http://schemas.openxmlformats.org/drawingml/2006/table">
@@ -10397,7 +10397,7 @@
                 <a:tableStyleId>{5940675A-B579-460E-94D1-54222C63F5DA}</a:tableStyleId>
               </a:tblPr>
               <a:tblGrid>
-                <a:gridCol w="745498">
+                <a:gridCol w="638002">
                   <a:extLst>
                     <a:ext uri="{9D8B030D-6E8A-4147-A177-3AD203B41FA5}">
                       <a16:colId xmlns:a16="http://schemas.microsoft.com/office/drawing/2014/main" val="1054931151"/>
@@ -10405,14 +10405,14 @@
                   </a:extLst>
                 </a:gridCol>
               </a:tblGrid>
-              <a:tr h="585216">
-                <a:tc>
-                  <a:txBody>
-                    <a:bodyPr/>
-                    <a:lstStyle/>
-                    <a:p>
-                      <a:r>
-                        <a:rPr lang="en-US" dirty="0"/>
+              <a:tr h="328246">
+                <a:tc>
+                  <a:txBody>
+                    <a:bodyPr/>
+                    <a:lstStyle/>
+                    <a:p>
+                      <a:r>
+                        <a:rPr lang="en-US" sz="1200" dirty="0"/>
                         <a:t>Line 0</a:t>
                       </a:r>
                     </a:p>
@@ -10425,14 +10425,14 @@
                   </a:ext>
                 </a:extLst>
               </a:tr>
-              <a:tr h="585216">
-                <a:tc>
-                  <a:txBody>
-                    <a:bodyPr/>
-                    <a:lstStyle/>
-                    <a:p>
-                      <a:r>
-                        <a:rPr lang="en-US" dirty="0"/>
+              <a:tr h="328246">
+                <a:tc>
+                  <a:txBody>
+                    <a:bodyPr/>
+                    <a:lstStyle/>
+                    <a:p>
+                      <a:r>
+                        <a:rPr lang="en-US" sz="1200" dirty="0"/>
                         <a:t>Line 1</a:t>
                       </a:r>
                     </a:p>
@@ -10445,14 +10445,14 @@
                   </a:ext>
                 </a:extLst>
               </a:tr>
-              <a:tr h="585216">
-                <a:tc>
-                  <a:txBody>
-                    <a:bodyPr/>
-                    <a:lstStyle/>
-                    <a:p>
-                      <a:r>
-                        <a:rPr lang="en-US" dirty="0"/>
+              <a:tr h="328246">
+                <a:tc>
+                  <a:txBody>
+                    <a:bodyPr/>
+                    <a:lstStyle/>
+                    <a:p>
+                      <a:r>
+                        <a:rPr lang="en-US" sz="1200" dirty="0"/>
                         <a:t>Line 2</a:t>
                       </a:r>
                     </a:p>
@@ -10465,14 +10465,14 @@
                   </a:ext>
                 </a:extLst>
               </a:tr>
-              <a:tr h="585216">
-                <a:tc>
-                  <a:txBody>
-                    <a:bodyPr/>
-                    <a:lstStyle/>
-                    <a:p>
-                      <a:r>
-                        <a:rPr lang="en-US" dirty="0"/>
+              <a:tr h="328246">
+                <a:tc>
+                  <a:txBody>
+                    <a:bodyPr/>
+                    <a:lstStyle/>
+                    <a:p>
+                      <a:r>
+                        <a:rPr lang="en-US" sz="1200" dirty="0"/>
                         <a:t>Line 3</a:t>
                       </a:r>
                     </a:p>
@@ -10485,14 +10485,14 @@
                   </a:ext>
                 </a:extLst>
               </a:tr>
-              <a:tr h="585216">
-                <a:tc>
-                  <a:txBody>
-                    <a:bodyPr/>
-                    <a:lstStyle/>
-                    <a:p>
-                      <a:r>
-                        <a:rPr lang="en-US" dirty="0"/>
+              <a:tr h="328246">
+                <a:tc>
+                  <a:txBody>
+                    <a:bodyPr/>
+                    <a:lstStyle/>
+                    <a:p>
+                      <a:r>
+                        <a:rPr lang="en-US" sz="1200" dirty="0"/>
                         <a:t>Line 4</a:t>
                       </a:r>
                     </a:p>
@@ -10505,57 +10505,14 @@
                   </a:ext>
                 </a:extLst>
               </a:tr>
-            </a:tbl>
-          </a:graphicData>
-        </a:graphic>
-      </p:graphicFrame>
-      <p:graphicFrame>
-        <p:nvGraphicFramePr>
-          <p:cNvPr id="16" name="Table 15">
-            <a:extLst>
-              <a:ext uri="{FF2B5EF4-FFF2-40B4-BE49-F238E27FC236}">
-                <a16:creationId xmlns:a16="http://schemas.microsoft.com/office/drawing/2014/main" id="{46E810D3-BCAC-934D-855C-9FF7B3308BBE}"/>
-              </a:ext>
-            </a:extLst>
-          </p:cNvPr>
-          <p:cNvGraphicFramePr>
-            <a:graphicFrameLocks noGrp="1"/>
-          </p:cNvGraphicFramePr>
-          <p:nvPr>
-            <p:extLst>
-              <p:ext uri="{D42A27DB-BD31-4B8C-83A1-F6EECF244321}">
-                <p14:modId xmlns:p14="http://schemas.microsoft.com/office/powerpoint/2010/main" val="667063067"/>
-              </p:ext>
-            </p:extLst>
-          </p:nvPr>
-        </p:nvGraphicFramePr>
-        <p:xfrm>
-          <a:off x="11192110" y="1859053"/>
-          <a:ext cx="745498" cy="2926080"/>
-        </p:xfrm>
-        <a:graphic>
-          <a:graphicData uri="http://schemas.openxmlformats.org/drawingml/2006/table">
-            <a:tbl>
-              <a:tblPr firstRow="1" bandRow="1">
-                <a:tableStyleId>{5940675A-B579-460E-94D1-54222C63F5DA}</a:tableStyleId>
-              </a:tblPr>
-              <a:tblGrid>
-                <a:gridCol w="745498">
-                  <a:extLst>
-                    <a:ext uri="{9D8B030D-6E8A-4147-A177-3AD203B41FA5}">
-                      <a16:colId xmlns:a16="http://schemas.microsoft.com/office/drawing/2014/main" val="1054931151"/>
-                    </a:ext>
-                  </a:extLst>
-                </a:gridCol>
-              </a:tblGrid>
-              <a:tr h="585216">
-                <a:tc>
-                  <a:txBody>
-                    <a:bodyPr/>
-                    <a:lstStyle/>
-                    <a:p>
-                      <a:r>
-                        <a:rPr lang="en-US" dirty="0"/>
+              <a:tr h="328246">
+                <a:tc>
+                  <a:txBody>
+                    <a:bodyPr/>
+                    <a:lstStyle/>
+                    <a:p>
+                      <a:r>
+                        <a:rPr lang="en-US" sz="1200" dirty="0"/>
                         <a:t>Line 5</a:t>
                       </a:r>
                     </a:p>
@@ -10564,18 +10521,18 @@
                 </a:tc>
                 <a:extLst>
                   <a:ext uri="{0D108BD9-81ED-4DB2-BD59-A6C34878D82A}">
-                    <a16:rowId xmlns:a16="http://schemas.microsoft.com/office/drawing/2014/main" val="1041752894"/>
+                    <a16:rowId xmlns:a16="http://schemas.microsoft.com/office/drawing/2014/main" val="4189346211"/>
                   </a:ext>
                 </a:extLst>
               </a:tr>
-              <a:tr h="585216">
-                <a:tc>
-                  <a:txBody>
-                    <a:bodyPr/>
-                    <a:lstStyle/>
-                    <a:p>
-                      <a:r>
-                        <a:rPr lang="en-US" dirty="0"/>
+              <a:tr h="328246">
+                <a:tc>
+                  <a:txBody>
+                    <a:bodyPr/>
+                    <a:lstStyle/>
+                    <a:p>
+                      <a:r>
+                        <a:rPr lang="en-US" sz="1200" dirty="0"/>
                         <a:t>Line 6</a:t>
                       </a:r>
                     </a:p>
@@ -10584,18 +10541,18 @@
                 </a:tc>
                 <a:extLst>
                   <a:ext uri="{0D108BD9-81ED-4DB2-BD59-A6C34878D82A}">
-                    <a16:rowId xmlns:a16="http://schemas.microsoft.com/office/drawing/2014/main" val="1760921122"/>
+                    <a16:rowId xmlns:a16="http://schemas.microsoft.com/office/drawing/2014/main" val="4067299778"/>
                   </a:ext>
                 </a:extLst>
               </a:tr>
-              <a:tr h="585216">
-                <a:tc>
-                  <a:txBody>
-                    <a:bodyPr/>
-                    <a:lstStyle/>
-                    <a:p>
-                      <a:r>
-                        <a:rPr lang="en-US" dirty="0"/>
+              <a:tr h="328246">
+                <a:tc>
+                  <a:txBody>
+                    <a:bodyPr/>
+                    <a:lstStyle/>
+                    <a:p>
+                      <a:r>
+                        <a:rPr lang="en-US" sz="1200" dirty="0"/>
                         <a:t>Line 7</a:t>
                       </a:r>
                     </a:p>
@@ -10604,18 +10561,18 @@
                 </a:tc>
                 <a:extLst>
                   <a:ext uri="{0D108BD9-81ED-4DB2-BD59-A6C34878D82A}">
-                    <a16:rowId xmlns:a16="http://schemas.microsoft.com/office/drawing/2014/main" val="3045800876"/>
+                    <a16:rowId xmlns:a16="http://schemas.microsoft.com/office/drawing/2014/main" val="978565573"/>
                   </a:ext>
                 </a:extLst>
               </a:tr>
-              <a:tr h="585216">
-                <a:tc>
-                  <a:txBody>
-                    <a:bodyPr/>
-                    <a:lstStyle/>
-                    <a:p>
-                      <a:r>
-                        <a:rPr lang="en-US" dirty="0"/>
+              <a:tr h="328246">
+                <a:tc>
+                  <a:txBody>
+                    <a:bodyPr/>
+                    <a:lstStyle/>
+                    <a:p>
+                      <a:r>
+                        <a:rPr lang="en-US" sz="1200" dirty="0"/>
                         <a:t>Line 8</a:t>
                       </a:r>
                     </a:p>
@@ -10624,27 +10581,7 @@
                 </a:tc>
                 <a:extLst>
                   <a:ext uri="{0D108BD9-81ED-4DB2-BD59-A6C34878D82A}">
-                    <a16:rowId xmlns:a16="http://schemas.microsoft.com/office/drawing/2014/main" val="2201208643"/>
-                  </a:ext>
-                </a:extLst>
-              </a:tr>
-              <a:tr h="585216">
-                <a:tc>
-                  <a:txBody>
-                    <a:bodyPr/>
-                    <a:lstStyle/>
-                    <a:p>
-                      <a:r>
-                        <a:rPr lang="en-US" dirty="0"/>
-                        <a:t>Line 9</a:t>
-                      </a:r>
-                    </a:p>
-                  </a:txBody>
-                  <a:tcPr/>
-                </a:tc>
-                <a:extLst>
-                  <a:ext uri="{0D108BD9-81ED-4DB2-BD59-A6C34878D82A}">
-                    <a16:rowId xmlns:a16="http://schemas.microsoft.com/office/drawing/2014/main" val="1258763262"/>
+                    <a16:rowId xmlns:a16="http://schemas.microsoft.com/office/drawing/2014/main" val="1169203172"/>
                   </a:ext>
                 </a:extLst>
               </a:tr>
@@ -10666,8 +10603,8 @@
         </p:nvSpPr>
         <p:spPr>
           <a:xfrm>
-            <a:off x="3446728" y="6397226"/>
-            <a:ext cx="5168659" cy="369332"/>
+            <a:off x="3249614" y="6211669"/>
+            <a:ext cx="6397392" cy="646331"/>
           </a:xfrm>
           <a:prstGeom prst="rect">
             <a:avLst/>
@@ -10711,8 +10648,243 @@
               <a:t> in computer memory</a:t>
             </a:r>
           </a:p>
+          <a:p>
+            <a:r>
+              <a:rPr lang="en-US" dirty="0">
+                <a:solidFill>
+                  <a:schemeClr val="tx2">
+                    <a:lumMod val="75000"/>
+                  </a:schemeClr>
+                </a:solidFill>
+              </a:rPr>
+              <a:t># To fit this in 1 slide, float and complex are assumed to be 4 bytes</a:t>
+            </a:r>
+          </a:p>
         </p:txBody>
       </p:sp>
+      <p:graphicFrame>
+        <p:nvGraphicFramePr>
+          <p:cNvPr id="18" name="Table 17">
+            <a:extLst>
+              <a:ext uri="{FF2B5EF4-FFF2-40B4-BE49-F238E27FC236}">
+                <a16:creationId xmlns:a16="http://schemas.microsoft.com/office/drawing/2014/main" id="{9EBC8F66-C9FD-DB41-B5D4-AEDA57302C06}"/>
+              </a:ext>
+            </a:extLst>
+          </p:cNvPr>
+          <p:cNvGraphicFramePr>
+            <a:graphicFrameLocks noGrp="1"/>
+          </p:cNvGraphicFramePr>
+          <p:nvPr>
+            <p:extLst>
+              <p:ext uri="{D42A27DB-BD31-4B8C-83A1-F6EECF244321}">
+                <p14:modId xmlns:p14="http://schemas.microsoft.com/office/powerpoint/2010/main" val="1299318574"/>
+              </p:ext>
+            </p:extLst>
+          </p:nvPr>
+        </p:nvGraphicFramePr>
+        <p:xfrm>
+          <a:off x="11206791" y="1844986"/>
+          <a:ext cx="638002" cy="2954214"/>
+        </p:xfrm>
+        <a:graphic>
+          <a:graphicData uri="http://schemas.openxmlformats.org/drawingml/2006/table">
+            <a:tbl>
+              <a:tblPr firstRow="1" bandRow="1">
+                <a:tableStyleId>{5940675A-B579-460E-94D1-54222C63F5DA}</a:tableStyleId>
+              </a:tblPr>
+              <a:tblGrid>
+                <a:gridCol w="638002">
+                  <a:extLst>
+                    <a:ext uri="{9D8B030D-6E8A-4147-A177-3AD203B41FA5}">
+                      <a16:colId xmlns:a16="http://schemas.microsoft.com/office/drawing/2014/main" val="1054931151"/>
+                    </a:ext>
+                  </a:extLst>
+                </a:gridCol>
+              </a:tblGrid>
+              <a:tr h="328246">
+                <a:tc>
+                  <a:txBody>
+                    <a:bodyPr/>
+                    <a:lstStyle/>
+                    <a:p>
+                      <a:r>
+                        <a:rPr lang="en-US" sz="1200" dirty="0"/>
+                        <a:t>Line 0</a:t>
+                      </a:r>
+                    </a:p>
+                  </a:txBody>
+                  <a:tcPr/>
+                </a:tc>
+                <a:extLst>
+                  <a:ext uri="{0D108BD9-81ED-4DB2-BD59-A6C34878D82A}">
+                    <a16:rowId xmlns:a16="http://schemas.microsoft.com/office/drawing/2014/main" val="1041752894"/>
+                  </a:ext>
+                </a:extLst>
+              </a:tr>
+              <a:tr h="328246">
+                <a:tc>
+                  <a:txBody>
+                    <a:bodyPr/>
+                    <a:lstStyle/>
+                    <a:p>
+                      <a:r>
+                        <a:rPr lang="en-US" sz="1200" dirty="0"/>
+                        <a:t>Line 1</a:t>
+                      </a:r>
+                    </a:p>
+                  </a:txBody>
+                  <a:tcPr/>
+                </a:tc>
+                <a:extLst>
+                  <a:ext uri="{0D108BD9-81ED-4DB2-BD59-A6C34878D82A}">
+                    <a16:rowId xmlns:a16="http://schemas.microsoft.com/office/drawing/2014/main" val="1760921122"/>
+                  </a:ext>
+                </a:extLst>
+              </a:tr>
+              <a:tr h="328246">
+                <a:tc>
+                  <a:txBody>
+                    <a:bodyPr/>
+                    <a:lstStyle/>
+                    <a:p>
+                      <a:r>
+                        <a:rPr lang="en-US" sz="1200" dirty="0"/>
+                        <a:t>Line 2</a:t>
+                      </a:r>
+                    </a:p>
+                  </a:txBody>
+                  <a:tcPr/>
+                </a:tc>
+                <a:extLst>
+                  <a:ext uri="{0D108BD9-81ED-4DB2-BD59-A6C34878D82A}">
+                    <a16:rowId xmlns:a16="http://schemas.microsoft.com/office/drawing/2014/main" val="3045800876"/>
+                  </a:ext>
+                </a:extLst>
+              </a:tr>
+              <a:tr h="328246">
+                <a:tc>
+                  <a:txBody>
+                    <a:bodyPr/>
+                    <a:lstStyle/>
+                    <a:p>
+                      <a:r>
+                        <a:rPr lang="en-US" sz="1200" dirty="0"/>
+                        <a:t>Line 3</a:t>
+                      </a:r>
+                    </a:p>
+                  </a:txBody>
+                  <a:tcPr/>
+                </a:tc>
+                <a:extLst>
+                  <a:ext uri="{0D108BD9-81ED-4DB2-BD59-A6C34878D82A}">
+                    <a16:rowId xmlns:a16="http://schemas.microsoft.com/office/drawing/2014/main" val="2201208643"/>
+                  </a:ext>
+                </a:extLst>
+              </a:tr>
+              <a:tr h="328246">
+                <a:tc>
+                  <a:txBody>
+                    <a:bodyPr/>
+                    <a:lstStyle/>
+                    <a:p>
+                      <a:r>
+                        <a:rPr lang="en-US" sz="1200" dirty="0"/>
+                        <a:t>Line 4</a:t>
+                      </a:r>
+                    </a:p>
+                  </a:txBody>
+                  <a:tcPr/>
+                </a:tc>
+                <a:extLst>
+                  <a:ext uri="{0D108BD9-81ED-4DB2-BD59-A6C34878D82A}">
+                    <a16:rowId xmlns:a16="http://schemas.microsoft.com/office/drawing/2014/main" val="1258763262"/>
+                  </a:ext>
+                </a:extLst>
+              </a:tr>
+              <a:tr h="328246">
+                <a:tc>
+                  <a:txBody>
+                    <a:bodyPr/>
+                    <a:lstStyle/>
+                    <a:p>
+                      <a:r>
+                        <a:rPr lang="en-US" sz="1200" dirty="0"/>
+                        <a:t>Line 5</a:t>
+                      </a:r>
+                    </a:p>
+                  </a:txBody>
+                  <a:tcPr/>
+                </a:tc>
+                <a:extLst>
+                  <a:ext uri="{0D108BD9-81ED-4DB2-BD59-A6C34878D82A}">
+                    <a16:rowId xmlns:a16="http://schemas.microsoft.com/office/drawing/2014/main" val="4189346211"/>
+                  </a:ext>
+                </a:extLst>
+              </a:tr>
+              <a:tr h="328246">
+                <a:tc>
+                  <a:txBody>
+                    <a:bodyPr/>
+                    <a:lstStyle/>
+                    <a:p>
+                      <a:r>
+                        <a:rPr lang="en-US" sz="1200" dirty="0"/>
+                        <a:t>Line 6</a:t>
+                      </a:r>
+                    </a:p>
+                  </a:txBody>
+                  <a:tcPr/>
+                </a:tc>
+                <a:extLst>
+                  <a:ext uri="{0D108BD9-81ED-4DB2-BD59-A6C34878D82A}">
+                    <a16:rowId xmlns:a16="http://schemas.microsoft.com/office/drawing/2014/main" val="4067299778"/>
+                  </a:ext>
+                </a:extLst>
+              </a:tr>
+              <a:tr h="328246">
+                <a:tc>
+                  <a:txBody>
+                    <a:bodyPr/>
+                    <a:lstStyle/>
+                    <a:p>
+                      <a:r>
+                        <a:rPr lang="en-US" sz="1200" dirty="0"/>
+                        <a:t>Line 7</a:t>
+                      </a:r>
+                    </a:p>
+                  </a:txBody>
+                  <a:tcPr/>
+                </a:tc>
+                <a:extLst>
+                  <a:ext uri="{0D108BD9-81ED-4DB2-BD59-A6C34878D82A}">
+                    <a16:rowId xmlns:a16="http://schemas.microsoft.com/office/drawing/2014/main" val="978565573"/>
+                  </a:ext>
+                </a:extLst>
+              </a:tr>
+              <a:tr h="328246">
+                <a:tc>
+                  <a:txBody>
+                    <a:bodyPr/>
+                    <a:lstStyle/>
+                    <a:p>
+                      <a:r>
+                        <a:rPr lang="en-US" sz="1200" dirty="0"/>
+                        <a:t>Line 8</a:t>
+                      </a:r>
+                    </a:p>
+                  </a:txBody>
+                  <a:tcPr/>
+                </a:tc>
+                <a:extLst>
+                  <a:ext uri="{0D108BD9-81ED-4DB2-BD59-A6C34878D82A}">
+                    <a16:rowId xmlns:a16="http://schemas.microsoft.com/office/drawing/2014/main" val="1169203172"/>
+                  </a:ext>
+                </a:extLst>
+              </a:tr>
+            </a:tbl>
+          </a:graphicData>
+        </a:graphic>
+      </p:graphicFrame>
     </p:spTree>
     <p:extLst>
       <p:ext uri="{BB962C8B-B14F-4D97-AF65-F5344CB8AC3E}">
@@ -11170,15 +11342,7 @@
             </a:pPr>
             <a:r>
               <a:rPr lang="en-US" dirty="0"/>
-              <a:t>Add these </a:t>
-            </a:r>
-            <a:r>
-              <a:rPr lang="en-US" dirty="0" err="1"/>
-              <a:t>rulea</a:t>
-            </a:r>
-            <a:r>
-              <a:rPr lang="en-US" dirty="0"/>
-              <a:t> to your mental model:</a:t>
+              <a:t>Add these rules to your mental model:</a:t>
             </a:r>
           </a:p>
           <a:p>

</xml_diff>